<commit_message>
finished understanding web services presentation
</commit_message>
<xml_diff>
--- a/presentations/Tools for testing web services.pptx
+++ b/presentations/Tools for testing web services.pptx
@@ -362,6 +362,11 @@
         </p:txBody>
       </p:sp>
     </p:spTree>
+    <p:extLst>
+      <p:ext uri="{BB962C8B-B14F-4D97-AF65-F5344CB8AC3E}">
+        <p14:creationId xmlns:p14="http://schemas.microsoft.com/office/powerpoint/2010/main" val="2055836642"/>
+      </p:ext>
+    </p:extLst>
   </p:cSld>
   <p:clrMap bg1="lt1" tx1="dk1" bg2="lt2" tx2="dk2" accent1="accent1" accent2="accent2" accent3="accent3" accent4="accent4" accent5="accent5" accent6="accent6" hlink="hlink" folHlink="folHlink"/>
   <p:notesStyle>
@@ -4184,7 +4189,6 @@
               <a:rPr lang="en-US" sz="4800" dirty="0" smtClean="0"/>
               <a:t>Testing Web Services</a:t>
             </a:r>
-            <a:endParaRPr lang="en-US" sz="4800" dirty="0" smtClean="0"/>
           </a:p>
         </p:txBody>
       </p:sp>
@@ -4404,7 +4408,6 @@
               <a:rPr lang="en-US" sz="4800" dirty="0" smtClean="0"/>
               <a:t>SOAPUI</a:t>
             </a:r>
-            <a:endParaRPr lang="en-US" sz="4800" dirty="0" smtClean="0"/>
           </a:p>
         </p:txBody>
       </p:sp>
@@ -4511,7 +4514,6 @@
               <a:rPr lang="en-US" sz="4800" dirty="0" smtClean="0"/>
               <a:t> </a:t>
             </a:r>
-            <a:endParaRPr lang="en-US" sz="4800" dirty="0" smtClean="0"/>
           </a:p>
         </p:txBody>
       </p:sp>

</xml_diff>